<commit_message>
Updated on last day
</commit_message>
<xml_diff>
--- a/document/Saigonese-Flight-Management-System.pptx
+++ b/document/Saigonese-Flight-Management-System.pptx
@@ -13443,7 +13443,7 @@
             <a:pPr lvl="1"/>
             <a:r>
               <a:rPr lang="en-US" sz="2800" dirty="0" smtClean="0"/>
-              <a:t>To view/search flights and make a booking </a:t>
+              <a:t>To view flights and make a booking </a:t>
             </a:r>
             <a:r>
               <a:rPr lang="en-US" sz="2800" dirty="0"/>
@@ -14789,15 +14789,25 @@
           <a:p>
             <a:r>
               <a:rPr lang="en-US" sz="3200" dirty="0"/>
-              <a:t> Technologies:</a:t>
-            </a:r>
+              <a:t> </a:t>
+            </a:r>
+            <a:r>
+              <a:rPr lang="en-US" sz="3200" dirty="0" smtClean="0"/>
+              <a:t>Feature &amp; Technologies:</a:t>
+            </a:r>
+            <a:endParaRPr lang="en-US" sz="3200" dirty="0"/>
           </a:p>
           <a:p>
             <a:pPr lvl="1"/>
             <a:r>
               <a:rPr lang="en-US" sz="2800" dirty="0" smtClean="0"/>
-              <a:t>Advanced Search</a:t>
-            </a:r>
+              <a:t>Search and Advanced Search, multiple customer </a:t>
+            </a:r>
+            <a:r>
+              <a:rPr lang="en-US" sz="2800" smtClean="0"/>
+              <a:t>online support</a:t>
+            </a:r>
+            <a:endParaRPr lang="en-US" sz="2800" dirty="0" smtClean="0"/>
           </a:p>
           <a:p>
             <a:pPr lvl="1"/>

</xml_diff>

<commit_message>
Update readme and slide
</commit_message>
<xml_diff>
--- a/document/Saigonese-Flight-Management-System.pptx
+++ b/document/Saigonese-Flight-Management-System.pptx
@@ -12,9 +12,9 @@
     <p:sldId id="257" r:id="rId3"/>
     <p:sldId id="258" r:id="rId4"/>
     <p:sldId id="265" r:id="rId5"/>
-    <p:sldId id="261" r:id="rId6"/>
-    <p:sldId id="259" r:id="rId7"/>
-    <p:sldId id="260" r:id="rId8"/>
+    <p:sldId id="260" r:id="rId6"/>
+    <p:sldId id="261" r:id="rId7"/>
+    <p:sldId id="259" r:id="rId8"/>
     <p:sldId id="262" r:id="rId9"/>
     <p:sldId id="264" r:id="rId10"/>
     <p:sldId id="263" r:id="rId11"/>
@@ -13148,7 +13148,6 @@
               <a:rPr lang="en-US" sz="3200" dirty="0" smtClean="0"/>
               <a:t>Introduction</a:t>
             </a:r>
-            <a:endParaRPr lang="en-US" sz="3200" dirty="0"/>
           </a:p>
           <a:p>
             <a:pPr marL="742950" indent="-742950">
@@ -13156,13 +13155,10 @@
               <a:buAutoNum type="arabicPeriod"/>
             </a:pPr>
             <a:r>
-              <a:rPr lang="en-US" sz="3200" dirty="0" smtClean="0"/>
-              <a:t>Main Use </a:t>
-            </a:r>
-            <a:r>
               <a:rPr lang="en-US" sz="3200" dirty="0"/>
-              <a:t>Cases</a:t>
-            </a:r>
+              <a:t>Technologies Used</a:t>
+            </a:r>
+            <a:endParaRPr lang="en-US" sz="3200" dirty="0"/>
           </a:p>
           <a:p>
             <a:pPr marL="742950" indent="-742950">
@@ -13170,8 +13166,12 @@
               <a:buAutoNum type="arabicPeriod"/>
             </a:pPr>
             <a:r>
+              <a:rPr lang="en-US" sz="3200" dirty="0" smtClean="0"/>
+              <a:t>Main Use </a:t>
+            </a:r>
+            <a:r>
               <a:rPr lang="en-US" sz="3200" dirty="0"/>
-              <a:t>Static Model</a:t>
+              <a:t>Cases</a:t>
             </a:r>
           </a:p>
           <a:p>
@@ -13181,8 +13181,13 @@
             </a:pPr>
             <a:r>
               <a:rPr lang="en-US" sz="3200" dirty="0"/>
-              <a:t>Technologies Used</a:t>
-            </a:r>
+              <a:t>Static </a:t>
+            </a:r>
+            <a:r>
+              <a:rPr lang="en-US" sz="3200" dirty="0" smtClean="0"/>
+              <a:t>Model</a:t>
+            </a:r>
+            <a:endParaRPr lang="en-US" sz="3200" dirty="0"/>
           </a:p>
           <a:p>
             <a:pPr marL="742950" indent="-742950">
@@ -13351,14 +13356,10 @@
           <a:p>
             <a:r>
               <a:rPr lang="en-US" sz="3200" dirty="0"/>
-              <a:t>The goal </a:t>
-            </a:r>
-            <a:r>
-              <a:rPr lang="en-US" sz="3200"/>
-              <a:t>is </a:t>
-            </a:r>
-            <a:r>
-              <a:rPr lang="en-US" sz="3200" smtClean="0"/>
+              <a:t>The goal is </a:t>
+            </a:r>
+            <a:r>
+              <a:rPr lang="en-US" sz="3200" dirty="0" smtClean="0"/>
               <a:t>to </a:t>
             </a:r>
             <a:r>
@@ -13554,6 +13555,282 @@
 </file>
 
 <file path=ppt/slides/slide5.xml><?xml version="1.0" encoding="utf-8"?>
+<p:sld xmlns:a="http://schemas.openxmlformats.org/drawingml/2006/main" xmlns:r="http://schemas.openxmlformats.org/officeDocument/2006/relationships" xmlns:p="http://schemas.openxmlformats.org/presentationml/2006/main">
+  <p:cSld>
+    <p:spTree>
+      <p:nvGrpSpPr>
+        <p:cNvPr id="1" name=""/>
+        <p:cNvGrpSpPr/>
+        <p:nvPr/>
+      </p:nvGrpSpPr>
+      <p:grpSpPr>
+        <a:xfrm>
+          <a:off x="0" y="0"/>
+          <a:ext cx="0" cy="0"/>
+          <a:chOff x="0" y="0"/>
+          <a:chExt cx="0" cy="0"/>
+        </a:xfrm>
+      </p:grpSpPr>
+      <p:sp>
+        <p:nvSpPr>
+          <p:cNvPr id="2" name="Title 1">
+            <a:extLst>
+              <a:ext uri="{FF2B5EF4-FFF2-40B4-BE49-F238E27FC236}">
+                <a16:creationId xmlns:a16="http://schemas.microsoft.com/office/drawing/2014/main" xmlns="" id="{C93179FA-8E2F-449F-A964-7E7BC2DF2DFC}"/>
+              </a:ext>
+            </a:extLst>
+          </p:cNvPr>
+          <p:cNvSpPr>
+            <a:spLocks noGrp="1"/>
+          </p:cNvSpPr>
+          <p:nvPr>
+            <p:ph type="title"/>
+          </p:nvPr>
+        </p:nvSpPr>
+        <p:spPr>
+          <a:xfrm>
+            <a:off x="1141413" y="618519"/>
+            <a:ext cx="9905998" cy="1024752"/>
+          </a:xfrm>
+        </p:spPr>
+        <p:txBody>
+          <a:bodyPr/>
+          <a:lstStyle/>
+          <a:p>
+            <a:r>
+              <a:rPr lang="en-US" dirty="0"/>
+              <a:t>Technologies used</a:t>
+            </a:r>
+          </a:p>
+        </p:txBody>
+      </p:sp>
+      <p:sp>
+        <p:nvSpPr>
+          <p:cNvPr id="3" name="Content Placeholder 2">
+            <a:extLst>
+              <a:ext uri="{FF2B5EF4-FFF2-40B4-BE49-F238E27FC236}">
+                <a16:creationId xmlns:a16="http://schemas.microsoft.com/office/drawing/2014/main" xmlns="" id="{95861D30-D862-4D1A-8629-627C31FF42C4}"/>
+              </a:ext>
+            </a:extLst>
+          </p:cNvPr>
+          <p:cNvSpPr>
+            <a:spLocks noGrp="1"/>
+          </p:cNvSpPr>
+          <p:nvPr>
+            <p:ph idx="1"/>
+          </p:nvPr>
+        </p:nvSpPr>
+        <p:spPr>
+          <a:xfrm>
+            <a:off x="1141412" y="1643270"/>
+            <a:ext cx="9905999" cy="4989023"/>
+          </a:xfrm>
+        </p:spPr>
+        <p:txBody>
+          <a:bodyPr>
+            <a:normAutofit/>
+          </a:bodyPr>
+          <a:lstStyle/>
+          <a:p>
+            <a:pPr lvl="1"/>
+            <a:r>
+              <a:rPr lang="en-US" sz="1600" dirty="0" smtClean="0">
+                <a:effectLst/>
+              </a:rPr>
+              <a:t>Annotation </a:t>
+            </a:r>
+            <a:endParaRPr lang="en-US" sz="1600" dirty="0">
+              <a:effectLst/>
+            </a:endParaRPr>
+          </a:p>
+          <a:p>
+            <a:pPr lvl="1"/>
+            <a:r>
+              <a:rPr lang="en-US" sz="1600" dirty="0">
+                <a:effectLst/>
+              </a:rPr>
+              <a:t>Data binding</a:t>
+            </a:r>
+          </a:p>
+          <a:p>
+            <a:pPr lvl="1"/>
+            <a:r>
+              <a:rPr lang="en-US" sz="1600" dirty="0">
+                <a:effectLst/>
+              </a:rPr>
+              <a:t>Validation; Custom Validation</a:t>
+            </a:r>
+          </a:p>
+          <a:p>
+            <a:pPr lvl="1"/>
+            <a:r>
+              <a:rPr lang="en-US" sz="1600" dirty="0">
+                <a:effectLst/>
+              </a:rPr>
+              <a:t>Custom </a:t>
+            </a:r>
+            <a:r>
+              <a:rPr lang="en-US" sz="1600" dirty="0" smtClean="0">
+                <a:effectLst/>
+              </a:rPr>
+              <a:t>Formatter, Interceptor</a:t>
+            </a:r>
+            <a:endParaRPr lang="en-US" sz="1600" dirty="0">
+              <a:effectLst/>
+            </a:endParaRPr>
+          </a:p>
+          <a:p>
+            <a:pPr lvl="1"/>
+            <a:r>
+              <a:rPr lang="en-US" sz="1600" dirty="0" smtClean="0">
+                <a:effectLst/>
+              </a:rPr>
+              <a:t>Internationalization</a:t>
+            </a:r>
+            <a:endParaRPr lang="en-US" sz="1600" dirty="0">
+              <a:effectLst/>
+            </a:endParaRPr>
+          </a:p>
+          <a:p>
+            <a:pPr lvl="1"/>
+            <a:r>
+              <a:rPr lang="en-US" sz="1600" dirty="0">
+                <a:effectLst/>
+              </a:rPr>
+              <a:t>Exception Handling</a:t>
+            </a:r>
+          </a:p>
+          <a:p>
+            <a:pPr lvl="1"/>
+            <a:r>
+              <a:rPr lang="en-US" sz="1600" dirty="0">
+                <a:effectLst/>
+              </a:rPr>
+              <a:t>REST/Ajax two way; error </a:t>
+            </a:r>
+            <a:r>
+              <a:rPr lang="en-US" sz="1600" dirty="0" smtClean="0">
+                <a:effectLst/>
+              </a:rPr>
+              <a:t>handling</a:t>
+            </a:r>
+            <a:endParaRPr lang="en-US" sz="1600" dirty="0">
+              <a:effectLst/>
+            </a:endParaRPr>
+          </a:p>
+          <a:p>
+            <a:pPr lvl="1"/>
+            <a:r>
+              <a:rPr lang="en-US" sz="1600" dirty="0" smtClean="0">
+                <a:effectLst/>
+              </a:rPr>
+              <a:t>Security; </a:t>
+            </a:r>
+            <a:r>
+              <a:rPr lang="en-US" sz="1600" smtClean="0">
+                <a:effectLst/>
+              </a:rPr>
+              <a:t>Authentication &amp; </a:t>
+            </a:r>
+            <a:r>
+              <a:rPr lang="en-US" sz="1600" dirty="0">
+                <a:effectLst/>
+              </a:rPr>
+              <a:t>Authorization</a:t>
+            </a:r>
+          </a:p>
+          <a:p>
+            <a:pPr lvl="1"/>
+            <a:r>
+              <a:rPr lang="en-US" sz="1600" dirty="0">
+                <a:effectLst/>
+              </a:rPr>
+              <a:t>Web Sockets</a:t>
+            </a:r>
+          </a:p>
+          <a:p>
+            <a:pPr lvl="1"/>
+            <a:r>
+              <a:rPr lang="en-US" sz="1600" dirty="0">
+                <a:effectLst/>
+              </a:rPr>
+              <a:t>Web Flow</a:t>
+            </a:r>
+          </a:p>
+          <a:p>
+            <a:pPr lvl="1"/>
+            <a:r>
+              <a:rPr lang="en-US" sz="1600" dirty="0" smtClean="0">
+                <a:effectLst/>
+              </a:rPr>
+              <a:t>Tiles</a:t>
+            </a:r>
+            <a:endParaRPr lang="en-US" sz="1600" dirty="0">
+              <a:effectLst/>
+            </a:endParaRPr>
+          </a:p>
+          <a:p>
+            <a:pPr lvl="1"/>
+            <a:r>
+              <a:rPr lang="en-US" sz="1600" dirty="0">
+                <a:effectLst/>
+              </a:rPr>
+              <a:t>Persistence in database [</a:t>
+            </a:r>
+            <a:r>
+              <a:rPr lang="en-US" sz="1600" dirty="0" smtClean="0">
+                <a:effectLst/>
+              </a:rPr>
+              <a:t>JPA]</a:t>
+            </a:r>
+            <a:endParaRPr lang="en-US" sz="1600" dirty="0"/>
+          </a:p>
+          <a:p>
+            <a:pPr lvl="1"/>
+            <a:r>
+              <a:rPr lang="en-US" sz="1600" dirty="0">
+                <a:effectLst/>
+              </a:rPr>
+              <a:t>DB</a:t>
+            </a:r>
+            <a:r>
+              <a:rPr lang="en-US" sz="1600" dirty="0">
+                <a:effectLst/>
+              </a:rPr>
+              <a:t>: </a:t>
+            </a:r>
+            <a:r>
+              <a:rPr lang="en-US" sz="1600" dirty="0">
+                <a:effectLst/>
+              </a:rPr>
+              <a:t>MySQL</a:t>
+            </a:r>
+            <a:endParaRPr lang="en-US" sz="1600" dirty="0">
+              <a:effectLst/>
+            </a:endParaRPr>
+          </a:p>
+          <a:p>
+            <a:endParaRPr lang="en-US" sz="3200" dirty="0"/>
+          </a:p>
+          <a:p>
+            <a:endParaRPr lang="en-US" sz="3200" dirty="0"/>
+          </a:p>
+        </p:txBody>
+      </p:sp>
+    </p:spTree>
+    <p:extLst>
+      <p:ext uri="{BB962C8B-B14F-4D97-AF65-F5344CB8AC3E}">
+        <p14:creationId xmlns:p14="http://schemas.microsoft.com/office/powerpoint/2010/main" val="3350333468"/>
+      </p:ext>
+    </p:extLst>
+  </p:cSld>
+  <p:clrMapOvr>
+    <a:masterClrMapping/>
+  </p:clrMapOvr>
+</p:sld>
+</file>
+
+<file path=ppt/slides/slide6.xml><?xml version="1.0" encoding="utf-8"?>
 <p:sld xmlns:a="http://schemas.openxmlformats.org/drawingml/2006/main" xmlns:r="http://schemas.openxmlformats.org/officeDocument/2006/relationships" xmlns:p="http://schemas.openxmlformats.org/presentationml/2006/main">
   <p:cSld>
     <p:spTree>
@@ -14344,137 +14621,6 @@
 </p:sld>
 </file>
 
-<file path=ppt/slides/slide6.xml><?xml version="1.0" encoding="utf-8"?>
-<p:sld xmlns:a="http://schemas.openxmlformats.org/drawingml/2006/main" xmlns:r="http://schemas.openxmlformats.org/officeDocument/2006/relationships" xmlns:p="http://schemas.openxmlformats.org/presentationml/2006/main">
-  <p:cSld>
-    <p:spTree>
-      <p:nvGrpSpPr>
-        <p:cNvPr id="1" name=""/>
-        <p:cNvGrpSpPr/>
-        <p:nvPr/>
-      </p:nvGrpSpPr>
-      <p:grpSpPr>
-        <a:xfrm>
-          <a:off x="0" y="0"/>
-          <a:ext cx="0" cy="0"/>
-          <a:chOff x="0" y="0"/>
-          <a:chExt cx="0" cy="0"/>
-        </a:xfrm>
-      </p:grpSpPr>
-      <p:sp>
-        <p:nvSpPr>
-          <p:cNvPr id="2" name="Title 1">
-            <a:extLst>
-              <a:ext uri="{FF2B5EF4-FFF2-40B4-BE49-F238E27FC236}">
-                <a16:creationId xmlns:a16="http://schemas.microsoft.com/office/drawing/2014/main" xmlns="" id="{C93179FA-8E2F-449F-A964-7E7BC2DF2DFC}"/>
-              </a:ext>
-            </a:extLst>
-          </p:cNvPr>
-          <p:cNvSpPr>
-            <a:spLocks noGrp="1"/>
-          </p:cNvSpPr>
-          <p:nvPr>
-            <p:ph type="title"/>
-          </p:nvPr>
-        </p:nvSpPr>
-        <p:spPr>
-          <a:xfrm>
-            <a:off x="1141413" y="618519"/>
-            <a:ext cx="9905998" cy="1024752"/>
-          </a:xfrm>
-        </p:spPr>
-        <p:txBody>
-          <a:bodyPr/>
-          <a:lstStyle/>
-          <a:p>
-            <a:r>
-              <a:rPr lang="en-US" dirty="0"/>
-              <a:t>Static model</a:t>
-            </a:r>
-          </a:p>
-        </p:txBody>
-      </p:sp>
-      <p:sp>
-        <p:nvSpPr>
-          <p:cNvPr id="3" name="Content Placeholder 2">
-            <a:extLst>
-              <a:ext uri="{FF2B5EF4-FFF2-40B4-BE49-F238E27FC236}">
-                <a16:creationId xmlns:a16="http://schemas.microsoft.com/office/drawing/2014/main" xmlns="" id="{95861D30-D862-4D1A-8629-627C31FF42C4}"/>
-              </a:ext>
-            </a:extLst>
-          </p:cNvPr>
-          <p:cNvSpPr>
-            <a:spLocks noGrp="1"/>
-          </p:cNvSpPr>
-          <p:nvPr>
-            <p:ph idx="1"/>
-          </p:nvPr>
-        </p:nvSpPr>
-        <p:spPr>
-          <a:xfrm>
-            <a:off x="1141412" y="1643271"/>
-            <a:ext cx="9905999" cy="4147930"/>
-          </a:xfrm>
-        </p:spPr>
-        <p:txBody>
-          <a:bodyPr>
-            <a:normAutofit/>
-          </a:bodyPr>
-          <a:lstStyle/>
-          <a:p>
-            <a:endParaRPr lang="en-US" sz="2800" dirty="0"/>
-          </a:p>
-          <a:p>
-            <a:endParaRPr lang="en-US" sz="2800" dirty="0"/>
-          </a:p>
-          <a:p>
-            <a:endParaRPr lang="en-US" sz="2800" dirty="0"/>
-          </a:p>
-        </p:txBody>
-      </p:sp>
-      <p:pic>
-        <p:nvPicPr>
-          <p:cNvPr id="5" name="Picture 4"/>
-          <p:cNvPicPr>
-            <a:picLocks noChangeAspect="1"/>
-          </p:cNvPicPr>
-          <p:nvPr/>
-        </p:nvPicPr>
-        <p:blipFill>
-          <a:blip r:embed="rId2">
-            <a:extLst>
-              <a:ext uri="{28A0092B-C50C-407E-A947-70E740481C1C}">
-                <a14:useLocalDpi xmlns:a14="http://schemas.microsoft.com/office/drawing/2010/main" val="0"/>
-              </a:ext>
-            </a:extLst>
-          </a:blip>
-          <a:stretch>
-            <a:fillRect/>
-          </a:stretch>
-        </p:blipFill>
-        <p:spPr>
-          <a:xfrm>
-            <a:off x="1953711" y="1431838"/>
-            <a:ext cx="7387059" cy="5212036"/>
-          </a:xfrm>
-          <a:prstGeom prst="rect">
-            <a:avLst/>
-          </a:prstGeom>
-        </p:spPr>
-      </p:pic>
-    </p:spTree>
-    <p:extLst>
-      <p:ext uri="{BB962C8B-B14F-4D97-AF65-F5344CB8AC3E}">
-        <p14:creationId xmlns:p14="http://schemas.microsoft.com/office/powerpoint/2010/main" val="412277805"/>
-      </p:ext>
-    </p:extLst>
-  </p:cSld>
-  <p:clrMapOvr>
-    <a:masterClrMapping/>
-  </p:clrMapOvr>
-</p:sld>
-</file>
-
 <file path=ppt/slides/slide7.xml><?xml version="1.0" encoding="utf-8"?>
 <p:sld xmlns:a="http://schemas.openxmlformats.org/drawingml/2006/main" xmlns:r="http://schemas.openxmlformats.org/officeDocument/2006/relationships" xmlns:p="http://schemas.openxmlformats.org/presentationml/2006/main">
   <p:cSld>
@@ -14520,7 +14666,7 @@
           <a:p>
             <a:r>
               <a:rPr lang="en-US" dirty="0"/>
-              <a:t>Technologies used</a:t>
+              <a:t>Static model</a:t>
             </a:r>
           </a:p>
         </p:txBody>
@@ -14543,8 +14689,8 @@
         </p:nvSpPr>
         <p:spPr>
           <a:xfrm>
-            <a:off x="1141412" y="1643270"/>
-            <a:ext cx="9905999" cy="4989023"/>
+            <a:off x="1141412" y="1643271"/>
+            <a:ext cx="9905999" cy="4147930"/>
           </a:xfrm>
         </p:spPr>
         <p:txBody>
@@ -14553,174 +14699,50 @@
           </a:bodyPr>
           <a:lstStyle/>
           <a:p>
-            <a:pPr lvl="1"/>
-            <a:r>
-              <a:rPr lang="en-US" sz="1600" dirty="0" smtClean="0">
-                <a:effectLst/>
-              </a:rPr>
-              <a:t>Annotation </a:t>
-            </a:r>
-            <a:endParaRPr lang="en-US" sz="1600" dirty="0">
-              <a:effectLst/>
-            </a:endParaRPr>
-          </a:p>
-          <a:p>
-            <a:pPr lvl="1"/>
-            <a:r>
-              <a:rPr lang="en-US" sz="1600" dirty="0">
-                <a:effectLst/>
-              </a:rPr>
-              <a:t>Data binding</a:t>
-            </a:r>
-          </a:p>
-          <a:p>
-            <a:pPr lvl="1"/>
-            <a:r>
-              <a:rPr lang="en-US" sz="1600" dirty="0">
-                <a:effectLst/>
-              </a:rPr>
-              <a:t>Validation; Custom Validation</a:t>
-            </a:r>
-          </a:p>
-          <a:p>
-            <a:pPr lvl="1"/>
-            <a:r>
-              <a:rPr lang="en-US" sz="1600" dirty="0">
-                <a:effectLst/>
-              </a:rPr>
-              <a:t>Custom Formatter</a:t>
-            </a:r>
-          </a:p>
-          <a:p>
-            <a:pPr lvl="1"/>
-            <a:r>
-              <a:rPr lang="en-US" sz="1600" dirty="0" smtClean="0">
-                <a:effectLst/>
-              </a:rPr>
-              <a:t>Internationalization</a:t>
-            </a:r>
-            <a:endParaRPr lang="en-US" sz="1600" dirty="0">
-              <a:effectLst/>
-            </a:endParaRPr>
-          </a:p>
-          <a:p>
-            <a:pPr lvl="1"/>
-            <a:r>
-              <a:rPr lang="en-US" sz="1600" dirty="0">
-                <a:effectLst/>
-              </a:rPr>
-              <a:t>Exception Handling</a:t>
-            </a:r>
-          </a:p>
-          <a:p>
-            <a:pPr lvl="1"/>
-            <a:r>
-              <a:rPr lang="en-US" sz="1600" dirty="0">
-                <a:effectLst/>
-              </a:rPr>
-              <a:t>REST/Ajax two way; error </a:t>
-            </a:r>
-            <a:r>
-              <a:rPr lang="en-US" sz="1600" dirty="0" smtClean="0">
-                <a:effectLst/>
-              </a:rPr>
-              <a:t>handling</a:t>
-            </a:r>
-            <a:endParaRPr lang="en-US" sz="1600" dirty="0">
-              <a:effectLst/>
-            </a:endParaRPr>
-          </a:p>
-          <a:p>
-            <a:pPr lvl="1"/>
-            <a:r>
-              <a:rPr lang="en-US" sz="1600" dirty="0">
-                <a:effectLst/>
-              </a:rPr>
-              <a:t>Security ; Login, Authorization</a:t>
-            </a:r>
-          </a:p>
-          <a:p>
-            <a:pPr lvl="1"/>
-            <a:r>
-              <a:rPr lang="en-US" sz="1600" dirty="0">
-                <a:effectLst/>
-              </a:rPr>
-              <a:t>Web Sockets</a:t>
-            </a:r>
-          </a:p>
-          <a:p>
-            <a:pPr lvl="1"/>
-            <a:r>
-              <a:rPr lang="en-US" sz="1600" dirty="0">
-                <a:effectLst/>
-              </a:rPr>
-              <a:t>Web Flow</a:t>
-            </a:r>
-          </a:p>
-          <a:p>
-            <a:pPr lvl="1"/>
-            <a:r>
-              <a:rPr lang="en-US" sz="1600" dirty="0" smtClean="0">
-                <a:effectLst/>
-              </a:rPr>
-              <a:t>Tiles</a:t>
-            </a:r>
-            <a:endParaRPr lang="en-US" sz="1600" dirty="0">
-              <a:effectLst/>
-            </a:endParaRPr>
-          </a:p>
-          <a:p>
-            <a:pPr lvl="1"/>
-            <a:r>
-              <a:rPr lang="en-US" sz="1600" dirty="0">
-                <a:effectLst/>
-              </a:rPr>
-              <a:t>Persistence in database [</a:t>
-            </a:r>
-            <a:r>
-              <a:rPr lang="en-US" sz="1600" dirty="0" smtClean="0">
-                <a:effectLst/>
-              </a:rPr>
-              <a:t>JPA]</a:t>
-            </a:r>
-            <a:endParaRPr lang="en-US" sz="1600" dirty="0"/>
-          </a:p>
-          <a:p>
-            <a:pPr lvl="1"/>
-            <a:r>
-              <a:rPr lang="en-US" sz="1600" dirty="0">
-                <a:effectLst/>
-              </a:rPr>
-              <a:t>DB</a:t>
-            </a:r>
-            <a:r>
-              <a:rPr lang="en-US" sz="1600" dirty="0">
-                <a:effectLst/>
-              </a:rPr>
-              <a:t>: </a:t>
-            </a:r>
-            <a:r>
-              <a:rPr lang="en-US" sz="1600" dirty="0">
-                <a:effectLst/>
-              </a:rPr>
-              <a:t>MySQL</a:t>
-            </a:r>
-            <a:endParaRPr lang="en-US" sz="1600" dirty="0">
-              <a:effectLst/>
-            </a:endParaRPr>
-          </a:p>
-          <a:p>
-            <a:endParaRPr lang="en-US" sz="3200" dirty="0"/>
-          </a:p>
-          <a:p>
-            <a:endParaRPr lang="en-US" sz="3200" dirty="0"/>
+            <a:endParaRPr lang="en-US" sz="2800" dirty="0"/>
+          </a:p>
+          <a:p>
+            <a:endParaRPr lang="en-US" sz="2800" dirty="0"/>
+          </a:p>
+          <a:p>
+            <a:endParaRPr lang="en-US" sz="2800" dirty="0"/>
           </a:p>
         </p:txBody>
       </p:sp>
+      <p:pic>
+        <p:nvPicPr>
+          <p:cNvPr id="5" name="Picture 4"/>
+          <p:cNvPicPr>
+            <a:picLocks noChangeAspect="1"/>
+          </p:cNvPicPr>
+          <p:nvPr/>
+        </p:nvPicPr>
+        <p:blipFill>
+          <a:blip r:embed="rId2">
+            <a:extLst>
+              <a:ext uri="{28A0092B-C50C-407E-A947-70E740481C1C}">
+                <a14:useLocalDpi xmlns:a14="http://schemas.microsoft.com/office/drawing/2010/main" val="0"/>
+              </a:ext>
+            </a:extLst>
+          </a:blip>
+          <a:stretch>
+            <a:fillRect/>
+          </a:stretch>
+        </p:blipFill>
+        <p:spPr>
+          <a:xfrm>
+            <a:off x="1953711" y="1431838"/>
+            <a:ext cx="7387059" cy="5212036"/>
+          </a:xfrm>
+          <a:prstGeom prst="rect">
+            <a:avLst/>
+          </a:prstGeom>
+        </p:spPr>
+      </p:pic>
     </p:spTree>
     <p:extLst>
       <p:ext uri="{BB962C8B-B14F-4D97-AF65-F5344CB8AC3E}">
-        <p14:creationId xmlns:p14="http://schemas.microsoft.com/office/powerpoint/2010/main" val="3350333468"/>
+        <p14:creationId xmlns:p14="http://schemas.microsoft.com/office/powerpoint/2010/main" val="412277805"/>
       </p:ext>
     </p:extLst>
   </p:cSld>

</xml_diff>